<commit_message>
Ajout du fichier PresentationFinal.pptx et suppression des fichiers incorrects
</commit_message>
<xml_diff>
--- a/PresentationFinal.pptx
+++ b/PresentationFinal.pptx
@@ -268,7 +268,7 @@
             <a:pPr rtl="0"/>
             <a:fld id="{ECAA93D1-D646-4BBE-A7FF-9E8922E2ED04}" type="datetime1">
               <a:rPr lang="fr-FR" smtClean="0"/>
-              <a:t>26/06/2024</a:t>
+              <a:t>27/06/2024</a:t>
             </a:fld>
             <a:endParaRPr lang="fr-FR" dirty="0"/>
           </a:p>
@@ -348,7 +348,7 @@
             <a:pPr rtl="0"/>
             <a:fld id="{04C1A770-BC94-4251-9494-95BA8C99FD05}" type="slidenum">
               <a:rPr lang="fr-FR" smtClean="0"/>
-              <a:t>‹N°›</a:t>
+              <a:t>‹#›</a:t>
             </a:fld>
             <a:endParaRPr lang="fr-FR"/>
           </a:p>
@@ -449,7 +449,7 @@
             <a:fld id="{E76B4465-1674-43CA-B5EE-1E45780B96EF}" type="datetime1">
               <a:rPr lang="fr-FR" smtClean="0"/>
               <a:pPr/>
-              <a:t>26/06/2024</a:t>
+              <a:t>27/06/2024</a:t>
             </a:fld>
             <a:endParaRPr lang="fr-FR" dirty="0"/>
           </a:p>
@@ -618,7 +618,7 @@
             <a:pPr rtl="0"/>
             <a:fld id="{339D21CC-DD94-204E-93C8-E1AAF3084C8D}" type="slidenum">
               <a:rPr lang="fr-FR" smtClean="0"/>
-              <a:t>‹N°›</a:t>
+              <a:t>‹#›</a:t>
             </a:fld>
             <a:endParaRPr lang="fr-FR" dirty="0"/>
           </a:p>
@@ -3173,8 +3173,8 @@
             <a:pPr rtl="0"/>
             <a:fld id="{CC43B8D3-9A08-F84C-9DD4-44948BA52D4B}" type="slidenum">
               <a:rPr lang="fr-FR" smtClean="0"/>
-              <a:pPr/>
-              <a:t>‹N°›</a:t>
+              <a:pPr rtl="0"/>
+              <a:t>‹#›</a:t>
             </a:fld>
             <a:endParaRPr lang="fr-FR" dirty="0"/>
           </a:p>
@@ -3488,7 +3488,7 @@
             <a:pPr rtl="0"/>
             <a:fld id="{CC43B8D3-9A08-F84C-9DD4-44948BA52D4B}" type="slidenum">
               <a:rPr lang="fr-FR" smtClean="0"/>
-              <a:t>‹N°›</a:t>
+              <a:t>‹#›</a:t>
             </a:fld>
             <a:endParaRPr lang="fr-FR" dirty="0"/>
           </a:p>
@@ -4625,8 +4625,8 @@
             <a:pPr rtl="0"/>
             <a:fld id="{CC43B8D3-9A08-F84C-9DD4-44948BA52D4B}" type="slidenum">
               <a:rPr lang="fr-FR" smtClean="0"/>
-              <a:pPr/>
-              <a:t>‹N°›</a:t>
+              <a:pPr rtl="0"/>
+              <a:t>‹#›</a:t>
             </a:fld>
             <a:endParaRPr lang="fr-FR" dirty="0"/>
           </a:p>
@@ -5747,8 +5747,8 @@
             <a:pPr rtl="0"/>
             <a:fld id="{CC43B8D3-9A08-F84C-9DD4-44948BA52D4B}" type="slidenum">
               <a:rPr lang="fr-FR" smtClean="0"/>
-              <a:pPr/>
-              <a:t>‹N°›</a:t>
+              <a:pPr rtl="0"/>
+              <a:t>‹#›</a:t>
             </a:fld>
             <a:endParaRPr lang="fr-FR" dirty="0"/>
           </a:p>
@@ -6424,8 +6424,8 @@
             <a:pPr rtl="0"/>
             <a:fld id="{CC43B8D3-9A08-F84C-9DD4-44948BA52D4B}" type="slidenum">
               <a:rPr lang="fr-FR" smtClean="0"/>
-              <a:pPr/>
-              <a:t>‹N°›</a:t>
+              <a:pPr rtl="0"/>
+              <a:t>‹#›</a:t>
             </a:fld>
             <a:endParaRPr lang="fr-FR" dirty="0"/>
           </a:p>
@@ -7829,8 +7829,8 @@
             <a:pPr rtl="0"/>
             <a:fld id="{CC43B8D3-9A08-F84C-9DD4-44948BA52D4B}" type="slidenum">
               <a:rPr lang="fr-FR" smtClean="0"/>
-              <a:pPr/>
-              <a:t>‹N°›</a:t>
+              <a:pPr rtl="0"/>
+              <a:t>‹#›</a:t>
             </a:fld>
             <a:endParaRPr lang="fr-FR" dirty="0"/>
           </a:p>
@@ -8815,8 +8815,8 @@
             <a:pPr rtl="0"/>
             <a:fld id="{CC43B8D3-9A08-F84C-9DD4-44948BA52D4B}" type="slidenum">
               <a:rPr lang="fr-FR" smtClean="0"/>
-              <a:pPr/>
-              <a:t>‹N°›</a:t>
+              <a:pPr rtl="0"/>
+              <a:t>‹#›</a:t>
             </a:fld>
             <a:endParaRPr lang="fr-FR" dirty="0"/>
           </a:p>
@@ -8965,8 +8965,8 @@
             <a:pPr rtl="0"/>
             <a:fld id="{CC43B8D3-9A08-F84C-9DD4-44948BA52D4B}" type="slidenum">
               <a:rPr lang="fr-FR" smtClean="0"/>
-              <a:pPr/>
-              <a:t>‹N°›</a:t>
+              <a:pPr rtl="0"/>
+              <a:t>‹#›</a:t>
             </a:fld>
             <a:endParaRPr lang="fr-FR" dirty="0"/>
           </a:p>
@@ -9309,8 +9309,8 @@
             <a:pPr rtl="0"/>
             <a:fld id="{CC43B8D3-9A08-F84C-9DD4-44948BA52D4B}" type="slidenum">
               <a:rPr lang="fr-FR" smtClean="0"/>
-              <a:pPr/>
-              <a:t>‹N°›</a:t>
+              <a:pPr rtl="0"/>
+              <a:t>‹#›</a:t>
             </a:fld>
             <a:endParaRPr lang="fr-FR" dirty="0"/>
           </a:p>
@@ -9978,8 +9978,8 @@
             <a:pPr rtl="0"/>
             <a:fld id="{CC43B8D3-9A08-F84C-9DD4-44948BA52D4B}" type="slidenum">
               <a:rPr lang="fr-FR" smtClean="0"/>
-              <a:pPr/>
-              <a:t>‹N°›</a:t>
+              <a:pPr rtl="0"/>
+              <a:t>‹#›</a:t>
             </a:fld>
             <a:endParaRPr lang="fr-FR" dirty="0"/>
           </a:p>
@@ -10267,8 +10267,8 @@
             <a:pPr rtl="0"/>
             <a:fld id="{CC43B8D3-9A08-F84C-9DD4-44948BA52D4B}" type="slidenum">
               <a:rPr lang="fr-FR" smtClean="0"/>
-              <a:pPr/>
-              <a:t>‹N°›</a:t>
+              <a:pPr rtl="0"/>
+              <a:t>‹#›</a:t>
             </a:fld>
             <a:endParaRPr lang="fr-FR" dirty="0"/>
           </a:p>
@@ -12052,8 +12052,8 @@
             <a:pPr rtl="0"/>
             <a:fld id="{CC43B8D3-9A08-F84C-9DD4-44948BA52D4B}" type="slidenum">
               <a:rPr lang="fr-FR" smtClean="0"/>
-              <a:pPr/>
-              <a:t>‹N°›</a:t>
+              <a:pPr rtl="0"/>
+              <a:t>‹#›</a:t>
             </a:fld>
             <a:endParaRPr lang="fr-FR" dirty="0"/>
           </a:p>
@@ -12558,8 +12558,8 @@
             <a:pPr rtl="0"/>
             <a:fld id="{CC43B8D3-9A08-F84C-9DD4-44948BA52D4B}" type="slidenum">
               <a:rPr lang="fr-FR" smtClean="0"/>
-              <a:pPr/>
-              <a:t>‹N°›</a:t>
+              <a:pPr rtl="0"/>
+              <a:t>‹#›</a:t>
             </a:fld>
             <a:endParaRPr lang="fr-FR" dirty="0"/>
           </a:p>
@@ -16278,8 +16278,8 @@
             <a:pPr rtl="0"/>
             <a:fld id="{CC43B8D3-9A08-F84C-9DD4-44948BA52D4B}" type="slidenum">
               <a:rPr lang="fr-FR" smtClean="0"/>
-              <a:pPr/>
-              <a:t>‹N°›</a:t>
+              <a:pPr rtl="0"/>
+              <a:t>‹#›</a:t>
             </a:fld>
             <a:endParaRPr lang="fr-FR" dirty="0"/>
           </a:p>
@@ -18299,8 +18299,8 @@
             <a:pPr rtl="0"/>
             <a:fld id="{CC43B8D3-9A08-F84C-9DD4-44948BA52D4B}" type="slidenum">
               <a:rPr lang="fr-FR" smtClean="0"/>
-              <a:pPr/>
-              <a:t>‹N°›</a:t>
+              <a:pPr rtl="0"/>
+              <a:t>‹#›</a:t>
             </a:fld>
             <a:endParaRPr lang="fr-FR" dirty="0"/>
           </a:p>
@@ -18499,8 +18499,8 @@
             <a:pPr rtl="0"/>
             <a:fld id="{CC43B8D3-9A08-F84C-9DD4-44948BA52D4B}" type="slidenum">
               <a:rPr lang="fr-FR" smtClean="0"/>
-              <a:pPr/>
-              <a:t>‹N°›</a:t>
+              <a:pPr rtl="0"/>
+              <a:t>‹#›</a:t>
             </a:fld>
             <a:endParaRPr lang="fr-FR" dirty="0"/>
           </a:p>
@@ -22951,8 +22951,13 @@
             <a:pPr rtl="0"/>
             <a:r>
               <a:rPr lang="fr-FR" dirty="0"/>
-              <a:t>Merci De votre Attention</a:t>
+              <a:t>Merci De </a:t>
             </a:r>
+            <a:r>
+              <a:rPr lang="fr-FR"/>
+              <a:t>votre Attention.</a:t>
+            </a:r>
+            <a:endParaRPr lang="fr-FR" dirty="0"/>
           </a:p>
         </p:txBody>
       </p:sp>
@@ -29608,35 +29613,6 @@
 </file>
 
 <file path=customXml/item1.xml><?xml version="1.0" encoding="utf-8"?>
-<p:properties xmlns:p="http://schemas.microsoft.com/office/2006/metadata/properties" xmlns:xsi="http://www.w3.org/2001/XMLSchema-instance" xmlns:pc="http://schemas.microsoft.com/office/infopath/2007/PartnerControls">
-  <documentManagement>
-    <_ip_UnifiedCompliancePolicyUIAction xmlns="http://schemas.microsoft.com/sharepoint/v3" xsi:nil="true"/>
-    <Image xmlns="71af3243-3dd4-4a8d-8c0d-dd76da1f02a5">
-      <Url xsi:nil="true"/>
-      <Description xsi:nil="true"/>
-    </Image>
-    <Status xmlns="71af3243-3dd4-4a8d-8c0d-dd76da1f02a5">Not started</Status>
-    <Background xmlns="71af3243-3dd4-4a8d-8c0d-dd76da1f02a5">false</Background>
-    <_ip_UnifiedCompliancePolicyProperties xmlns="http://schemas.microsoft.com/sharepoint/v3" xsi:nil="true"/>
-    <ImageTagsTaxHTField xmlns="71af3243-3dd4-4a8d-8c0d-dd76da1f02a5">
-      <Terms xmlns="http://schemas.microsoft.com/office/infopath/2007/PartnerControls"/>
-    </ImageTagsTaxHTField>
-    <TaxCatchAll xmlns="230e9df3-be65-4c73-a93b-d1236ebd677e" xsi:nil="true"/>
-    <MediaServiceKeyPoints xmlns="71af3243-3dd4-4a8d-8c0d-dd76da1f02a5" xsi:nil="true"/>
-  </documentManagement>
-</p:properties>
-</file>
-
-<file path=customXml/item2.xml><?xml version="1.0" encoding="utf-8"?>
-<?mso-contentType ?>
-<FormTemplates xmlns="http://schemas.microsoft.com/sharepoint/v3/contenttype/forms">
-  <Display>DocumentLibraryForm</Display>
-  <Edit>DocumentLibraryForm</Edit>
-  <New>DocumentLibraryForm</New>
-</FormTemplates>
-</file>
-
-<file path=customXml/item3.xml><?xml version="1.0" encoding="utf-8"?>
 <ct:contentTypeSchema xmlns:ct="http://schemas.microsoft.com/office/2006/metadata/contentType" xmlns:ma="http://schemas.microsoft.com/office/2006/metadata/properties/metaAttributes" ct:_="" ma:_="" ma:contentTypeName="Document" ma:contentTypeID="0x01010079F111ED35F8CC479449609E8A0923A6" ma:contentTypeVersion="25" ma:contentTypeDescription="Create a new document." ma:contentTypeScope="" ma:versionID="e02306daf00165b375dc6a58966960be">
   <xsd:schema xmlns:xsd="http://www.w3.org/2001/XMLSchema" xmlns:xs="http://www.w3.org/2001/XMLSchema" xmlns:p="http://schemas.microsoft.com/office/2006/metadata/properties" xmlns:ns1="http://schemas.microsoft.com/sharepoint/v3" xmlns:ns2="71af3243-3dd4-4a8d-8c0d-dd76da1f02a5" xmlns:ns3="16c05727-aa75-4e4a-9b5f-8a80a1165891" xmlns:ns4="230e9df3-be65-4c73-a93b-d1236ebd677e" targetNamespace="http://schemas.microsoft.com/office/2006/metadata/properties" ma:root="true" ma:fieldsID="df88fb76bf5f555224557953949c1ec9" ns1:_="" ns2:_="" ns3:_="" ns4:_="">
     <xsd:import namespace="http://schemas.microsoft.com/sharepoint/v3"/>
@@ -29930,27 +29906,36 @@
 </ct:contentTypeSchema>
 </file>
 
-<file path=customXml/itemProps1.xml><?xml version="1.0" encoding="utf-8"?>
-<ds:datastoreItem xmlns:ds="http://schemas.openxmlformats.org/officeDocument/2006/customXml" ds:itemID="{C431C809-C6F0-48D7-BF3E-4570CDAF51AF}">
-  <ds:schemaRefs>
-    <ds:schemaRef ds:uri="http://schemas.microsoft.com/office/2006/metadata/properties"/>
-    <ds:schemaRef ds:uri="http://schemas.microsoft.com/office/infopath/2007/PartnerControls"/>
-    <ds:schemaRef ds:uri="http://schemas.microsoft.com/sharepoint/v3"/>
-    <ds:schemaRef ds:uri="71af3243-3dd4-4a8d-8c0d-dd76da1f02a5"/>
-    <ds:schemaRef ds:uri="230e9df3-be65-4c73-a93b-d1236ebd677e"/>
-  </ds:schemaRefs>
-</ds:datastoreItem>
+<file path=customXml/item2.xml><?xml version="1.0" encoding="utf-8"?>
+<?mso-contentType ?>
+<FormTemplates xmlns="http://schemas.microsoft.com/sharepoint/v3/contenttype/forms">
+  <Display>DocumentLibraryForm</Display>
+  <Edit>DocumentLibraryForm</Edit>
+  <New>DocumentLibraryForm</New>
+</FormTemplates>
 </file>
 
-<file path=customXml/itemProps2.xml><?xml version="1.0" encoding="utf-8"?>
-<ds:datastoreItem xmlns:ds="http://schemas.openxmlformats.org/officeDocument/2006/customXml" ds:itemID="{7E30B917-A3AD-46B5-A6A4-F876E3BAC36E}">
-  <ds:schemaRefs>
-    <ds:schemaRef ds:uri="http://schemas.microsoft.com/sharepoint/v3/contenttype/forms"/>
-  </ds:schemaRefs>
-</ds:datastoreItem>
+<file path=customXml/item3.xml><?xml version="1.0" encoding="utf-8"?>
+<p:properties xmlns:p="http://schemas.microsoft.com/office/2006/metadata/properties" xmlns:xsi="http://www.w3.org/2001/XMLSchema-instance" xmlns:pc="http://schemas.microsoft.com/office/infopath/2007/PartnerControls">
+  <documentManagement>
+    <_ip_UnifiedCompliancePolicyUIAction xmlns="http://schemas.microsoft.com/sharepoint/v3" xsi:nil="true"/>
+    <Image xmlns="71af3243-3dd4-4a8d-8c0d-dd76da1f02a5">
+      <Url xsi:nil="true"/>
+      <Description xsi:nil="true"/>
+    </Image>
+    <Status xmlns="71af3243-3dd4-4a8d-8c0d-dd76da1f02a5">Not started</Status>
+    <Background xmlns="71af3243-3dd4-4a8d-8c0d-dd76da1f02a5">false</Background>
+    <_ip_UnifiedCompliancePolicyProperties xmlns="http://schemas.microsoft.com/sharepoint/v3" xsi:nil="true"/>
+    <ImageTagsTaxHTField xmlns="71af3243-3dd4-4a8d-8c0d-dd76da1f02a5">
+      <Terms xmlns="http://schemas.microsoft.com/office/infopath/2007/PartnerControls"/>
+    </ImageTagsTaxHTField>
+    <TaxCatchAll xmlns="230e9df3-be65-4c73-a93b-d1236ebd677e" xsi:nil="true"/>
+    <MediaServiceKeyPoints xmlns="71af3243-3dd4-4a8d-8c0d-dd76da1f02a5" xsi:nil="true"/>
+  </documentManagement>
+</p:properties>
 </file>
 
-<file path=customXml/itemProps3.xml><?xml version="1.0" encoding="utf-8"?>
+<file path=customXml/itemProps1.xml><?xml version="1.0" encoding="utf-8"?>
 <ds:datastoreItem xmlns:ds="http://schemas.openxmlformats.org/officeDocument/2006/customXml" ds:itemID="{E8C75813-FBB5-478B-828B-AC67018E2728}">
   <ds:schemaRefs>
     <ds:schemaRef ds:uri="http://schemas.microsoft.com/office/2006/metadata/contentType"/>
@@ -29971,6 +29956,26 @@
 </ds:datastoreItem>
 </file>
 
+<file path=customXml/itemProps2.xml><?xml version="1.0" encoding="utf-8"?>
+<ds:datastoreItem xmlns:ds="http://schemas.openxmlformats.org/officeDocument/2006/customXml" ds:itemID="{7E30B917-A3AD-46B5-A6A4-F876E3BAC36E}">
+  <ds:schemaRefs>
+    <ds:schemaRef ds:uri="http://schemas.microsoft.com/sharepoint/v3/contenttype/forms"/>
+  </ds:schemaRefs>
+</ds:datastoreItem>
+</file>
+
+<file path=customXml/itemProps3.xml><?xml version="1.0" encoding="utf-8"?>
+<ds:datastoreItem xmlns:ds="http://schemas.openxmlformats.org/officeDocument/2006/customXml" ds:itemID="{C431C809-C6F0-48D7-BF3E-4570CDAF51AF}">
+  <ds:schemaRefs>
+    <ds:schemaRef ds:uri="http://schemas.microsoft.com/office/2006/metadata/properties"/>
+    <ds:schemaRef ds:uri="http://schemas.microsoft.com/office/infopath/2007/PartnerControls"/>
+    <ds:schemaRef ds:uri="http://schemas.microsoft.com/sharepoint/v3"/>
+    <ds:schemaRef ds:uri="71af3243-3dd4-4a8d-8c0d-dd76da1f02a5"/>
+    <ds:schemaRef ds:uri="230e9df3-be65-4c73-a93b-d1236ebd677e"/>
+  </ds:schemaRefs>
+</ds:datastoreItem>
+</file>
+
 <file path=docMetadata/LabelInfo.xml><?xml version="1.0" encoding="utf-8"?>
 <clbl:labelList xmlns:clbl="http://schemas.microsoft.com/office/2020/mipLabelMetadata"/>
 </file>
</xml_diff>

<commit_message>
Updated scripts and maquettes, added new presentation and report files, and updated cache
</commit_message>
<xml_diff>
--- a/PresentationFinal.pptx
+++ b/PresentationFinal.pptx
@@ -19233,136 +19233,6 @@
               <a:latin typeface="Times New Roman" panose="02020603050405020304" pitchFamily="18" charset="0"/>
               <a:cs typeface="Times New Roman" panose="02020603050405020304" pitchFamily="18" charset="0"/>
             </a:endParaRPr>
-          </a:p>
-        </p:txBody>
-      </p:sp>
-      <p:sp>
-        <p:nvSpPr>
-          <p:cNvPr id="13" name="Espace réservé du numéro de diapositive 10">
-            <a:extLst>
-              <a:ext uri="{FF2B5EF4-FFF2-40B4-BE49-F238E27FC236}">
-                <a16:creationId xmlns:a16="http://schemas.microsoft.com/office/drawing/2014/main" id="{C47DA815-3588-E526-EDAD-B0C1293AC28A}"/>
-              </a:ext>
-            </a:extLst>
-          </p:cNvPr>
-          <p:cNvSpPr txBox="1">
-            <a:spLocks/>
-          </p:cNvSpPr>
-          <p:nvPr/>
-        </p:nvSpPr>
-        <p:spPr>
-          <a:xfrm>
-            <a:off x="8610600" y="6356350"/>
-            <a:ext cx="2743200" cy="365125"/>
-          </a:xfrm>
-          <a:prstGeom prst="rect">
-            <a:avLst/>
-          </a:prstGeom>
-        </p:spPr>
-        <p:txBody>
-          <a:bodyPr/>
-          <a:lstStyle>
-            <a:defPPr rtl="0">
-              <a:defRPr lang="fr-FR"/>
-            </a:defPPr>
-            <a:lvl1pPr marL="0" algn="l" defTabSz="914400" rtl="0" eaLnBrk="1" latinLnBrk="0" hangingPunct="1">
-              <a:defRPr lang="fr-FR" sz="1800" kern="1200">
-                <a:solidFill>
-                  <a:schemeClr val="tx1"/>
-                </a:solidFill>
-                <a:latin typeface="+mn-lt"/>
-                <a:ea typeface="+mn-ea"/>
-                <a:cs typeface="+mn-cs"/>
-              </a:defRPr>
-            </a:lvl1pPr>
-            <a:lvl2pPr marL="457200" algn="l" defTabSz="914400" rtl="0" eaLnBrk="1" latinLnBrk="0" hangingPunct="1">
-              <a:defRPr lang="fr-FR" sz="1800" kern="1200">
-                <a:solidFill>
-                  <a:schemeClr val="tx1"/>
-                </a:solidFill>
-                <a:latin typeface="+mn-lt"/>
-                <a:ea typeface="+mn-ea"/>
-                <a:cs typeface="+mn-cs"/>
-              </a:defRPr>
-            </a:lvl2pPr>
-            <a:lvl3pPr marL="914400" algn="l" defTabSz="914400" rtl="0" eaLnBrk="1" latinLnBrk="0" hangingPunct="1">
-              <a:defRPr lang="fr-FR" sz="1800" kern="1200">
-                <a:solidFill>
-                  <a:schemeClr val="tx1"/>
-                </a:solidFill>
-                <a:latin typeface="+mn-lt"/>
-                <a:ea typeface="+mn-ea"/>
-                <a:cs typeface="+mn-cs"/>
-              </a:defRPr>
-            </a:lvl3pPr>
-            <a:lvl4pPr marL="1371600" algn="l" defTabSz="914400" rtl="0" eaLnBrk="1" latinLnBrk="0" hangingPunct="1">
-              <a:defRPr lang="fr-FR" sz="1800" kern="1200">
-                <a:solidFill>
-                  <a:schemeClr val="tx1"/>
-                </a:solidFill>
-                <a:latin typeface="+mn-lt"/>
-                <a:ea typeface="+mn-ea"/>
-                <a:cs typeface="+mn-cs"/>
-              </a:defRPr>
-            </a:lvl4pPr>
-            <a:lvl5pPr marL="1828800" algn="l" defTabSz="914400" rtl="0" eaLnBrk="1" latinLnBrk="0" hangingPunct="1">
-              <a:defRPr lang="fr-FR" sz="1800" kern="1200">
-                <a:solidFill>
-                  <a:schemeClr val="tx1"/>
-                </a:solidFill>
-                <a:latin typeface="+mn-lt"/>
-                <a:ea typeface="+mn-ea"/>
-                <a:cs typeface="+mn-cs"/>
-              </a:defRPr>
-            </a:lvl5pPr>
-            <a:lvl6pPr marL="2286000" algn="l" defTabSz="914400" rtl="0" eaLnBrk="1" latinLnBrk="0" hangingPunct="1">
-              <a:defRPr lang="fr-FR" sz="1800" kern="1200">
-                <a:solidFill>
-                  <a:schemeClr val="tx1"/>
-                </a:solidFill>
-                <a:latin typeface="+mn-lt"/>
-                <a:ea typeface="+mn-ea"/>
-                <a:cs typeface="+mn-cs"/>
-              </a:defRPr>
-            </a:lvl6pPr>
-            <a:lvl7pPr marL="2743200" algn="l" defTabSz="914400" rtl="0" eaLnBrk="1" latinLnBrk="0" hangingPunct="1">
-              <a:defRPr lang="fr-FR" sz="1800" kern="1200">
-                <a:solidFill>
-                  <a:schemeClr val="tx1"/>
-                </a:solidFill>
-                <a:latin typeface="+mn-lt"/>
-                <a:ea typeface="+mn-ea"/>
-                <a:cs typeface="+mn-cs"/>
-              </a:defRPr>
-            </a:lvl7pPr>
-            <a:lvl8pPr marL="3200400" algn="l" defTabSz="914400" rtl="0" eaLnBrk="1" latinLnBrk="0" hangingPunct="1">
-              <a:defRPr lang="fr-FR" sz="1800" kern="1200">
-                <a:solidFill>
-                  <a:schemeClr val="tx1"/>
-                </a:solidFill>
-                <a:latin typeface="+mn-lt"/>
-                <a:ea typeface="+mn-ea"/>
-                <a:cs typeface="+mn-cs"/>
-              </a:defRPr>
-            </a:lvl8pPr>
-            <a:lvl9pPr marL="3657600" algn="l" defTabSz="914400" rtl="0" eaLnBrk="1" latinLnBrk="0" hangingPunct="1">
-              <a:defRPr lang="fr-FR" sz="1800" kern="1200">
-                <a:solidFill>
-                  <a:schemeClr val="tx1"/>
-                </a:solidFill>
-                <a:latin typeface="+mn-lt"/>
-                <a:ea typeface="+mn-ea"/>
-                <a:cs typeface="+mn-cs"/>
-              </a:defRPr>
-            </a:lvl9pPr>
-          </a:lstStyle>
-          <a:p>
-            <a:fld id="{C73D9BE5-FDEF-9F4F-AE87-8B6645184203}" type="slidenum">
-              <a:rPr lang="fr-US" sz="1600" smtClean="0"/>
-              <a:pPr/>
-              <a:t>1</a:t>
-            </a:fld>
-            <a:endParaRPr lang="fr-US" sz="1600" dirty="0"/>
           </a:p>
         </p:txBody>
       </p:sp>
@@ -20153,7 +20023,7 @@
           <p:nvPr>
             <p:extLst>
               <p:ext uri="{D42A27DB-BD31-4B8C-83A1-F6EECF244321}">
-                <p14:modId xmlns:p14="http://schemas.microsoft.com/office/powerpoint/2010/main" val="2426656111"/>
+                <p14:modId xmlns:p14="http://schemas.microsoft.com/office/powerpoint/2010/main" val="99719011"/>
               </p:ext>
             </p:extLst>
           </p:nvPr>
@@ -20379,7 +20249,7 @@
                         <a:rPr lang="fr-FR" sz="1600" kern="100" dirty="0">
                           <a:effectLst/>
                         </a:rPr>
-                        <a:t>Développement des interface utilisateur (</a:t>
+                        <a:t>Développement des interfaces utilisateur (</a:t>
                       </a:r>
                       <a:r>
                         <a:rPr lang="fr-FR" sz="1600" kern="100" dirty="0" err="1">
@@ -20606,6 +20476,17 @@
               <a:tabLst/>
             </a:pPr>
             <a:r>
+              <a:rPr lang="fr-FR" altLang="fr-US" sz="2400" dirty="0">
+                <a:solidFill>
+                  <a:srgbClr val="000000"/>
+                </a:solidFill>
+                <a:latin typeface="Arial" panose="020B0604020202020204" pitchFamily="34" charset="0"/>
+                <a:ea typeface="DengXian" panose="02010600030101010101" pitchFamily="2" charset="-122"/>
+                <a:cs typeface="Arial" panose="020B0604020202020204" pitchFamily="34" charset="0"/>
+              </a:rPr>
+              <a:t>L</a:t>
+            </a:r>
+            <a:r>
               <a:rPr kumimoji="0" lang="fr-FR" altLang="fr-US" sz="2400" b="0" i="0" u="none" strike="noStrike" cap="none" normalizeH="0" baseline="0" dirty="0">
                 <a:ln>
                   <a:noFill/>
@@ -20618,7 +20499,7 @@
                 <a:ea typeface="DengXian" panose="02010600030101010101" pitchFamily="2" charset="-122"/>
                 <a:cs typeface="Arial" panose="020B0604020202020204" pitchFamily="34" charset="0"/>
               </a:rPr>
-              <a:t>De prime abord, le d</a:t>
+              <a:t>e d</a:t>
             </a:r>
             <a:r>
               <a:rPr kumimoji="0" lang="fr-FR" altLang="fr-US" sz="2400" b="0" i="0" u="none" strike="noStrike" cap="none" normalizeH="0" baseline="0" dirty="0">
@@ -20780,6 +20661,42 @@
               <a:t>10</a:t>
             </a:fld>
             <a:endParaRPr lang="fr-FR" dirty="0"/>
+          </a:p>
+        </p:txBody>
+      </p:sp>
+      <p:sp>
+        <p:nvSpPr>
+          <p:cNvPr id="6" name="TextBox 5">
+            <a:extLst>
+              <a:ext uri="{FF2B5EF4-FFF2-40B4-BE49-F238E27FC236}">
+                <a16:creationId xmlns:a16="http://schemas.microsoft.com/office/drawing/2014/main" id="{1C9A9456-0744-444C-91EB-EF5EFDAC725D}"/>
+              </a:ext>
+            </a:extLst>
+          </p:cNvPr>
+          <p:cNvSpPr txBox="1"/>
+          <p:nvPr/>
+        </p:nvSpPr>
+        <p:spPr>
+          <a:xfrm>
+            <a:off x="11499575" y="6137475"/>
+            <a:ext cx="356420" cy="369332"/>
+          </a:xfrm>
+          <a:prstGeom prst="rect">
+            <a:avLst/>
+          </a:prstGeom>
+          <a:noFill/>
+        </p:spPr>
+        <p:txBody>
+          <a:bodyPr wrap="square">
+            <a:spAutoFit/>
+          </a:bodyPr>
+          <a:lstStyle/>
+          <a:p>
+            <a:r>
+              <a:rPr lang="fr-FR" dirty="0"/>
+              <a:t>9</a:t>
+            </a:r>
+            <a:endParaRPr lang="en-US" dirty="0"/>
           </a:p>
         </p:txBody>
       </p:sp>
@@ -21245,6 +21162,42 @@
           </a:p>
         </p:txBody>
       </p:sp>
+      <p:sp>
+        <p:nvSpPr>
+          <p:cNvPr id="5" name="TextBox 4">
+            <a:extLst>
+              <a:ext uri="{FF2B5EF4-FFF2-40B4-BE49-F238E27FC236}">
+                <a16:creationId xmlns:a16="http://schemas.microsoft.com/office/drawing/2014/main" id="{B4185F3F-8FBB-400E-A1B9-ABFEE4C4951C}"/>
+              </a:ext>
+            </a:extLst>
+          </p:cNvPr>
+          <p:cNvSpPr txBox="1"/>
+          <p:nvPr/>
+        </p:nvSpPr>
+        <p:spPr>
+          <a:xfrm>
+            <a:off x="11334750" y="6137475"/>
+            <a:ext cx="521245" cy="369332"/>
+          </a:xfrm>
+          <a:prstGeom prst="rect">
+            <a:avLst/>
+          </a:prstGeom>
+          <a:noFill/>
+        </p:spPr>
+        <p:txBody>
+          <a:bodyPr wrap="square">
+            <a:spAutoFit/>
+          </a:bodyPr>
+          <a:lstStyle/>
+          <a:p>
+            <a:r>
+              <a:rPr lang="fr-FR" dirty="0"/>
+              <a:t>10</a:t>
+            </a:r>
+            <a:endParaRPr lang="en-US" dirty="0"/>
+          </a:p>
+        </p:txBody>
+      </p:sp>
     </p:spTree>
     <p:extLst>
       <p:ext uri="{BB962C8B-B14F-4D97-AF65-F5344CB8AC3E}">
@@ -21416,6 +21369,42 @@
           </a:p>
         </p:txBody>
       </p:sp>
+      <p:sp>
+        <p:nvSpPr>
+          <p:cNvPr id="5" name="TextBox 4">
+            <a:extLst>
+              <a:ext uri="{FF2B5EF4-FFF2-40B4-BE49-F238E27FC236}">
+                <a16:creationId xmlns:a16="http://schemas.microsoft.com/office/drawing/2014/main" id="{504793C3-7E0C-4CE6-97BB-A4C62D8A90A6}"/>
+              </a:ext>
+            </a:extLst>
+          </p:cNvPr>
+          <p:cNvSpPr txBox="1"/>
+          <p:nvPr/>
+        </p:nvSpPr>
+        <p:spPr>
+          <a:xfrm>
+            <a:off x="11068050" y="6011643"/>
+            <a:ext cx="597445" cy="369332"/>
+          </a:xfrm>
+          <a:prstGeom prst="rect">
+            <a:avLst/>
+          </a:prstGeom>
+          <a:noFill/>
+        </p:spPr>
+        <p:txBody>
+          <a:bodyPr wrap="square">
+            <a:spAutoFit/>
+          </a:bodyPr>
+          <a:lstStyle/>
+          <a:p>
+            <a:r>
+              <a:rPr lang="fr-FR" dirty="0"/>
+              <a:t>11</a:t>
+            </a:r>
+            <a:endParaRPr lang="en-US" dirty="0"/>
+          </a:p>
+        </p:txBody>
+      </p:sp>
     </p:spTree>
     <p:extLst>
       <p:ext uri="{BB962C8B-B14F-4D97-AF65-F5344CB8AC3E}">
@@ -21804,6 +21793,42 @@
               </a:rPr>
               <a:t>Application</a:t>
             </a:r>
+          </a:p>
+        </p:txBody>
+      </p:sp>
+      <p:sp>
+        <p:nvSpPr>
+          <p:cNvPr id="11" name="TextBox 10">
+            <a:extLst>
+              <a:ext uri="{FF2B5EF4-FFF2-40B4-BE49-F238E27FC236}">
+                <a16:creationId xmlns:a16="http://schemas.microsoft.com/office/drawing/2014/main" id="{24AA1558-BE53-4F98-ADB1-D6892BFD8FB3}"/>
+              </a:ext>
+            </a:extLst>
+          </p:cNvPr>
+          <p:cNvSpPr txBox="1"/>
+          <p:nvPr/>
+        </p:nvSpPr>
+        <p:spPr>
+          <a:xfrm>
+            <a:off x="11068050" y="6011643"/>
+            <a:ext cx="597445" cy="369332"/>
+          </a:xfrm>
+          <a:prstGeom prst="rect">
+            <a:avLst/>
+          </a:prstGeom>
+          <a:noFill/>
+        </p:spPr>
+        <p:txBody>
+          <a:bodyPr wrap="square">
+            <a:spAutoFit/>
+          </a:bodyPr>
+          <a:lstStyle/>
+          <a:p>
+            <a:r>
+              <a:rPr lang="fr-FR" dirty="0"/>
+              <a:t>12</a:t>
+            </a:r>
+            <a:endParaRPr lang="en-US" dirty="0"/>
           </a:p>
         </p:txBody>
       </p:sp>
@@ -22648,6 +22673,42 @@
           </a:p>
         </p:txBody>
       </p:sp>
+      <p:sp>
+        <p:nvSpPr>
+          <p:cNvPr id="8" name="TextBox 7">
+            <a:extLst>
+              <a:ext uri="{FF2B5EF4-FFF2-40B4-BE49-F238E27FC236}">
+                <a16:creationId xmlns:a16="http://schemas.microsoft.com/office/drawing/2014/main" id="{D742BCBE-1BA5-4366-B1F2-7C4BEEE3BE76}"/>
+              </a:ext>
+            </a:extLst>
+          </p:cNvPr>
+          <p:cNvSpPr txBox="1"/>
+          <p:nvPr/>
+        </p:nvSpPr>
+        <p:spPr>
+          <a:xfrm>
+            <a:off x="11068050" y="6011643"/>
+            <a:ext cx="597445" cy="369332"/>
+          </a:xfrm>
+          <a:prstGeom prst="rect">
+            <a:avLst/>
+          </a:prstGeom>
+          <a:noFill/>
+        </p:spPr>
+        <p:txBody>
+          <a:bodyPr wrap="square">
+            <a:spAutoFit/>
+          </a:bodyPr>
+          <a:lstStyle/>
+          <a:p>
+            <a:r>
+              <a:rPr lang="fr-FR" dirty="0"/>
+              <a:t>13</a:t>
+            </a:r>
+            <a:endParaRPr lang="en-US" dirty="0"/>
+          </a:p>
+        </p:txBody>
+      </p:sp>
     </p:spTree>
     <p:extLst>
       <p:ext uri="{BB962C8B-B14F-4D97-AF65-F5344CB8AC3E}">
@@ -22951,13 +23012,44 @@
             <a:pPr rtl="0"/>
             <a:r>
               <a:rPr lang="fr-FR" dirty="0"/>
-              <a:t>Merci De </a:t>
+              <a:t>Merci De votre Attention</a:t>
             </a:r>
+          </a:p>
+        </p:txBody>
+      </p:sp>
+      <p:sp>
+        <p:nvSpPr>
+          <p:cNvPr id="4" name="TextBox 3">
+            <a:extLst>
+              <a:ext uri="{FF2B5EF4-FFF2-40B4-BE49-F238E27FC236}">
+                <a16:creationId xmlns:a16="http://schemas.microsoft.com/office/drawing/2014/main" id="{64B762F0-3F6F-4443-810C-F52CF211ACAE}"/>
+              </a:ext>
+            </a:extLst>
+          </p:cNvPr>
+          <p:cNvSpPr txBox="1"/>
+          <p:nvPr/>
+        </p:nvSpPr>
+        <p:spPr>
+          <a:xfrm>
+            <a:off x="11068050" y="6011643"/>
+            <a:ext cx="597445" cy="369332"/>
+          </a:xfrm>
+          <a:prstGeom prst="rect">
+            <a:avLst/>
+          </a:prstGeom>
+          <a:noFill/>
+        </p:spPr>
+        <p:txBody>
+          <a:bodyPr wrap="square">
+            <a:spAutoFit/>
+          </a:bodyPr>
+          <a:lstStyle/>
+          <a:p>
             <a:r>
-              <a:rPr lang="fr-FR"/>
-              <a:t>votre Attention.</a:t>
+              <a:rPr lang="fr-FR" dirty="0"/>
+              <a:t>14</a:t>
             </a:r>
-            <a:endParaRPr lang="fr-FR" dirty="0"/>
+            <a:endParaRPr lang="en-US" dirty="0"/>
           </a:p>
         </p:txBody>
       </p:sp>
@@ -23034,6 +23126,42 @@
               <a:latin typeface="Times New Roman" panose="02020603050405020304" pitchFamily="18" charset="0"/>
               <a:cs typeface="Times New Roman" panose="02020603050405020304" pitchFamily="18" charset="0"/>
             </a:endParaRPr>
+          </a:p>
+        </p:txBody>
+      </p:sp>
+      <p:sp>
+        <p:nvSpPr>
+          <p:cNvPr id="4" name="TextBox 3">
+            <a:extLst>
+              <a:ext uri="{FF2B5EF4-FFF2-40B4-BE49-F238E27FC236}">
+                <a16:creationId xmlns:a16="http://schemas.microsoft.com/office/drawing/2014/main" id="{75F02CEE-6DE9-42FA-B767-866E7BE5C7C0}"/>
+              </a:ext>
+            </a:extLst>
+          </p:cNvPr>
+          <p:cNvSpPr txBox="1"/>
+          <p:nvPr/>
+        </p:nvSpPr>
+        <p:spPr>
+          <a:xfrm>
+            <a:off x="11499575" y="6137475"/>
+            <a:ext cx="356420" cy="369332"/>
+          </a:xfrm>
+          <a:prstGeom prst="rect">
+            <a:avLst/>
+          </a:prstGeom>
+          <a:noFill/>
+        </p:spPr>
+        <p:txBody>
+          <a:bodyPr wrap="square">
+            <a:spAutoFit/>
+          </a:bodyPr>
+          <a:lstStyle/>
+          <a:p>
+            <a:r>
+              <a:rPr lang="fr-FR" dirty="0"/>
+              <a:t>1</a:t>
+            </a:r>
+            <a:endParaRPr lang="en-US" dirty="0"/>
           </a:p>
         </p:txBody>
       </p:sp>
@@ -24086,6 +24214,42 @@
               </a:rPr>
               <a:t>CONCLUSION</a:t>
             </a:r>
+          </a:p>
+        </p:txBody>
+      </p:sp>
+      <p:sp>
+        <p:nvSpPr>
+          <p:cNvPr id="19" name="TextBox 18">
+            <a:extLst>
+              <a:ext uri="{FF2B5EF4-FFF2-40B4-BE49-F238E27FC236}">
+                <a16:creationId xmlns:a16="http://schemas.microsoft.com/office/drawing/2014/main" id="{6BC60585-B676-4316-A96C-93B653B37023}"/>
+              </a:ext>
+            </a:extLst>
+          </p:cNvPr>
+          <p:cNvSpPr txBox="1"/>
+          <p:nvPr/>
+        </p:nvSpPr>
+        <p:spPr>
+          <a:xfrm>
+            <a:off x="11499575" y="6137475"/>
+            <a:ext cx="356420" cy="369332"/>
+          </a:xfrm>
+          <a:prstGeom prst="rect">
+            <a:avLst/>
+          </a:prstGeom>
+          <a:noFill/>
+        </p:spPr>
+        <p:txBody>
+          <a:bodyPr wrap="square">
+            <a:spAutoFit/>
+          </a:bodyPr>
+          <a:lstStyle/>
+          <a:p>
+            <a:r>
+              <a:rPr lang="fr-FR" dirty="0"/>
+              <a:t>2</a:t>
+            </a:r>
+            <a:endParaRPr lang="en-US" dirty="0"/>
           </a:p>
         </p:txBody>
       </p:sp>
@@ -25277,60 +25441,6 @@
       </p:sp>
       <p:sp>
         <p:nvSpPr>
-          <p:cNvPr id="13" name="Rectangle 12">
-            <a:extLst>
-              <a:ext uri="{FF2B5EF4-FFF2-40B4-BE49-F238E27FC236}">
-                <a16:creationId xmlns:a16="http://schemas.microsoft.com/office/drawing/2014/main" id="{8ED842E8-4CFD-9BA5-A83C-BD5C6495CE7C}"/>
-              </a:ext>
-            </a:extLst>
-          </p:cNvPr>
-          <p:cNvSpPr/>
-          <p:nvPr/>
-        </p:nvSpPr>
-        <p:spPr>
-          <a:xfrm>
-            <a:off x="9533743" y="1556375"/>
-            <a:ext cx="2189812" cy="5301625"/>
-          </a:xfrm>
-          <a:prstGeom prst="rect">
-            <a:avLst/>
-          </a:prstGeom>
-          <a:solidFill>
-            <a:schemeClr val="bg2"/>
-          </a:solidFill>
-          <a:ln>
-            <a:solidFill>
-              <a:schemeClr val="bg2"/>
-            </a:solidFill>
-          </a:ln>
-        </p:spPr>
-        <p:style>
-          <a:lnRef idx="2">
-            <a:schemeClr val="accent1">
-              <a:shade val="15000"/>
-            </a:schemeClr>
-          </a:lnRef>
-          <a:fillRef idx="1">
-            <a:schemeClr val="accent1"/>
-          </a:fillRef>
-          <a:effectRef idx="0">
-            <a:schemeClr val="accent1"/>
-          </a:effectRef>
-          <a:fontRef idx="minor">
-            <a:schemeClr val="lt1"/>
-          </a:fontRef>
-        </p:style>
-        <p:txBody>
-          <a:bodyPr rtlCol="0" anchor="ctr"/>
-          <a:lstStyle/>
-          <a:p>
-            <a:pPr algn="ctr"/>
-            <a:endParaRPr lang="fr-US"/>
-          </a:p>
-        </p:txBody>
-      </p:sp>
-      <p:sp>
-        <p:nvSpPr>
           <p:cNvPr id="8" name="Espace réservé du texte 7">
             <a:extLst>
               <a:ext uri="{FF2B5EF4-FFF2-40B4-BE49-F238E27FC236}">
@@ -25503,45 +25613,37 @@
       </p:sp>
       <p:sp>
         <p:nvSpPr>
-          <p:cNvPr id="2" name="Espace réservé du numéro de diapositive 1">
-            <a:extLst>
-              <a:ext uri="{FF2B5EF4-FFF2-40B4-BE49-F238E27FC236}">
-                <a16:creationId xmlns:a16="http://schemas.microsoft.com/office/drawing/2014/main" id="{965866DB-3EEC-F345-CB19-37D867FAC94D}"/>
-              </a:ext>
-            </a:extLst>
-          </p:cNvPr>
-          <p:cNvSpPr>
-            <a:spLocks noGrp="1"/>
-          </p:cNvSpPr>
-          <p:nvPr>
-            <p:ph type="sldNum" sz="quarter" idx="16"/>
-          </p:nvPr>
-        </p:nvSpPr>
-        <p:spPr>
-          <a:xfrm>
-            <a:off x="9995803" y="6019954"/>
-            <a:ext cx="941832" cy="621792"/>
-          </a:xfrm>
-        </p:spPr>
-        <p:txBody>
-          <a:bodyPr/>
+          <p:cNvPr id="9" name="TextBox 8">
+            <a:extLst>
+              <a:ext uri="{FF2B5EF4-FFF2-40B4-BE49-F238E27FC236}">
+                <a16:creationId xmlns:a16="http://schemas.microsoft.com/office/drawing/2014/main" id="{24B89CE9-9B77-475B-9605-555FF428393A}"/>
+              </a:ext>
+            </a:extLst>
+          </p:cNvPr>
+          <p:cNvSpPr txBox="1"/>
+          <p:nvPr/>
+        </p:nvSpPr>
+        <p:spPr>
+          <a:xfrm>
+            <a:off x="10644169" y="6010168"/>
+            <a:ext cx="356420" cy="369332"/>
+          </a:xfrm>
+          <a:prstGeom prst="rect">
+            <a:avLst/>
+          </a:prstGeom>
+          <a:noFill/>
+        </p:spPr>
+        <p:txBody>
+          <a:bodyPr wrap="square">
+            <a:spAutoFit/>
+          </a:bodyPr>
           <a:lstStyle/>
           <a:p>
-            <a:pPr rtl="0"/>
-            <a:fld id="{CC43B8D3-9A08-F84C-9DD4-44948BA52D4B}" type="slidenum">
-              <a:rPr lang="fr-FR" smtClean="0">
-                <a:solidFill>
-                  <a:schemeClr val="tx1"/>
-                </a:solidFill>
-              </a:rPr>
-              <a:pPr rtl="0"/>
-              <a:t>4</a:t>
-            </a:fld>
-            <a:endParaRPr lang="fr-FR" dirty="0">
-              <a:solidFill>
-                <a:schemeClr val="tx1"/>
-              </a:solidFill>
-            </a:endParaRPr>
+            <a:r>
+              <a:rPr lang="fr-FR" dirty="0"/>
+              <a:t>3</a:t>
+            </a:r>
+            <a:endParaRPr lang="en-US" dirty="0"/>
           </a:p>
         </p:txBody>
       </p:sp>
@@ -25630,6 +25732,42 @@
               </a:rPr>
               <a:t>2. ACTEURS DU PROJET</a:t>
             </a:r>
+          </a:p>
+        </p:txBody>
+      </p:sp>
+      <p:sp>
+        <p:nvSpPr>
+          <p:cNvPr id="4" name="TextBox 3">
+            <a:extLst>
+              <a:ext uri="{FF2B5EF4-FFF2-40B4-BE49-F238E27FC236}">
+                <a16:creationId xmlns:a16="http://schemas.microsoft.com/office/drawing/2014/main" id="{D64429C9-D31A-4B04-9D35-162CB8A924C2}"/>
+              </a:ext>
+            </a:extLst>
+          </p:cNvPr>
+          <p:cNvSpPr txBox="1"/>
+          <p:nvPr/>
+        </p:nvSpPr>
+        <p:spPr>
+          <a:xfrm>
+            <a:off x="10654001" y="5960495"/>
+            <a:ext cx="356420" cy="369332"/>
+          </a:xfrm>
+          <a:prstGeom prst="rect">
+            <a:avLst/>
+          </a:prstGeom>
+          <a:noFill/>
+        </p:spPr>
+        <p:txBody>
+          <a:bodyPr wrap="square">
+            <a:spAutoFit/>
+          </a:bodyPr>
+          <a:lstStyle/>
+          <a:p>
+            <a:r>
+              <a:rPr lang="fr-FR" dirty="0"/>
+              <a:t>4</a:t>
+            </a:r>
+            <a:endParaRPr lang="en-US" dirty="0"/>
           </a:p>
         </p:txBody>
       </p:sp>
@@ -26142,8 +26280,8 @@
         </p:nvSpPr>
         <p:spPr>
           <a:xfrm>
-            <a:off x="7989107" y="2803533"/>
-            <a:ext cx="1240560" cy="1047415"/>
+            <a:off x="7989106" y="2803533"/>
+            <a:ext cx="1678150" cy="1519827"/>
           </a:xfrm>
           <a:prstGeom prst="ellipse">
             <a:avLst/>
@@ -26233,7 +26371,7 @@
         <p:spPr>
           <a:xfrm>
             <a:off x="3125046" y="4890227"/>
-            <a:ext cx="4444369" cy="1804928"/>
+            <a:ext cx="4818948" cy="1804928"/>
           </a:xfrm>
           <a:prstGeom prst="roundRect">
             <a:avLst/>
@@ -26441,7 +26579,7 @@
         <p:spPr>
           <a:xfrm>
             <a:off x="7083063" y="3327240"/>
-            <a:ext cx="906044" cy="1"/>
+            <a:ext cx="906043" cy="236207"/>
           </a:xfrm>
           <a:prstGeom prst="line">
             <a:avLst/>
@@ -26611,8 +26749,8 @@
         </p:nvSpPr>
         <p:spPr>
           <a:xfrm>
-            <a:off x="8101983" y="2983552"/>
-            <a:ext cx="1127684" cy="646331"/>
+            <a:off x="8256211" y="2963281"/>
+            <a:ext cx="1354708" cy="1200329"/>
           </a:xfrm>
           <a:prstGeom prst="rect">
             <a:avLst/>
@@ -26626,9 +26764,32 @@
           <a:lstStyle/>
           <a:p>
             <a:r>
-              <a:rPr lang="fr-US" sz="1800" b="1" dirty="0"/>
+              <a:rPr lang="fr-US" sz="1800" b="1" dirty="0">
+                <a:solidFill>
+                  <a:srgbClr val="00B0F0"/>
+                </a:solidFill>
+              </a:rPr>
               <a:t>Expert Interne</a:t>
             </a:r>
+            <a:endParaRPr lang="fr-FR" sz="1800" b="1" dirty="0">
+              <a:solidFill>
+                <a:srgbClr val="00B0F0"/>
+              </a:solidFill>
+            </a:endParaRPr>
+          </a:p>
+          <a:p>
+            <a:endParaRPr lang="fr-FR" b="1" dirty="0"/>
+          </a:p>
+          <a:p>
+            <a:r>
+              <a:rPr lang="fr-FR" sz="1800" b="1" dirty="0"/>
+              <a:t>Dr </a:t>
+            </a:r>
+            <a:r>
+              <a:rPr lang="fr-FR" sz="1800" b="1" dirty="0" err="1"/>
+              <a:t>Soro</a:t>
+            </a:r>
+            <a:endParaRPr lang="fr-US" sz="1800" b="1" dirty="0"/>
           </a:p>
         </p:txBody>
       </p:sp>
@@ -26698,6 +26859,198 @@
           </a:p>
         </p:txBody>
       </p:sp>
+      <p:sp>
+        <p:nvSpPr>
+          <p:cNvPr id="24" name="TextBox 23">
+            <a:extLst>
+              <a:ext uri="{FF2B5EF4-FFF2-40B4-BE49-F238E27FC236}">
+                <a16:creationId xmlns:a16="http://schemas.microsoft.com/office/drawing/2014/main" id="{7B65BE9E-635E-4686-8C02-FC6E70389975}"/>
+              </a:ext>
+            </a:extLst>
+          </p:cNvPr>
+          <p:cNvSpPr txBox="1"/>
+          <p:nvPr/>
+        </p:nvSpPr>
+        <p:spPr>
+          <a:xfrm>
+            <a:off x="11499575" y="6137475"/>
+            <a:ext cx="356420" cy="369332"/>
+          </a:xfrm>
+          <a:prstGeom prst="rect">
+            <a:avLst/>
+          </a:prstGeom>
+          <a:noFill/>
+        </p:spPr>
+        <p:txBody>
+          <a:bodyPr wrap="square">
+            <a:spAutoFit/>
+          </a:bodyPr>
+          <a:lstStyle/>
+          <a:p>
+            <a:r>
+              <a:rPr lang="fr-FR" dirty="0"/>
+              <a:t>5</a:t>
+            </a:r>
+            <a:endParaRPr lang="en-US" dirty="0"/>
+          </a:p>
+        </p:txBody>
+      </p:sp>
+      <p:sp>
+        <p:nvSpPr>
+          <p:cNvPr id="41" name="Rectangle : coins arrondis 30">
+            <a:extLst>
+              <a:ext uri="{FF2B5EF4-FFF2-40B4-BE49-F238E27FC236}">
+                <a16:creationId xmlns:a16="http://schemas.microsoft.com/office/drawing/2014/main" id="{0E23A1B3-9D45-41F6-A330-B5A0335AB576}"/>
+              </a:ext>
+            </a:extLst>
+          </p:cNvPr>
+          <p:cNvSpPr/>
+          <p:nvPr/>
+        </p:nvSpPr>
+        <p:spPr>
+          <a:xfrm>
+            <a:off x="330090" y="5211974"/>
+            <a:ext cx="2341990" cy="1394414"/>
+          </a:xfrm>
+          <a:prstGeom prst="roundRect">
+            <a:avLst/>
+          </a:prstGeom>
+          <a:noFill/>
+          <a:ln>
+            <a:solidFill>
+              <a:schemeClr val="tx1"/>
+            </a:solidFill>
+          </a:ln>
+        </p:spPr>
+        <p:style>
+          <a:lnRef idx="2">
+            <a:schemeClr val="accent1">
+              <a:shade val="15000"/>
+            </a:schemeClr>
+          </a:lnRef>
+          <a:fillRef idx="1">
+            <a:schemeClr val="accent1"/>
+          </a:fillRef>
+          <a:effectRef idx="0">
+            <a:schemeClr val="accent1"/>
+          </a:effectRef>
+          <a:fontRef idx="minor">
+            <a:schemeClr val="lt1"/>
+          </a:fontRef>
+        </p:style>
+        <p:txBody>
+          <a:bodyPr rtlCol="0" anchor="ctr"/>
+          <a:lstStyle/>
+          <a:p>
+            <a:r>
+              <a:rPr lang="fr-US" sz="1800" b="1" dirty="0">
+                <a:solidFill>
+                  <a:schemeClr val="tx1"/>
+                </a:solidFill>
+              </a:rPr>
+              <a:t>AGOH CHRIS</a:t>
+            </a:r>
+          </a:p>
+        </p:txBody>
+      </p:sp>
+      <p:sp>
+        <p:nvSpPr>
+          <p:cNvPr id="44" name="TextBox 43">
+            <a:extLst>
+              <a:ext uri="{FF2B5EF4-FFF2-40B4-BE49-F238E27FC236}">
+                <a16:creationId xmlns:a16="http://schemas.microsoft.com/office/drawing/2014/main" id="{2B606CEC-6B05-4A71-95CD-C22F3D7645A7}"/>
+              </a:ext>
+            </a:extLst>
+          </p:cNvPr>
+          <p:cNvSpPr txBox="1"/>
+          <p:nvPr/>
+        </p:nvSpPr>
+        <p:spPr>
+          <a:xfrm>
+            <a:off x="300391" y="5359551"/>
+            <a:ext cx="2599904" cy="307777"/>
+          </a:xfrm>
+          <a:prstGeom prst="rect">
+            <a:avLst/>
+          </a:prstGeom>
+          <a:noFill/>
+        </p:spPr>
+        <p:txBody>
+          <a:bodyPr wrap="square">
+            <a:spAutoFit/>
+          </a:bodyPr>
+          <a:lstStyle/>
+          <a:p>
+            <a:r>
+              <a:rPr lang="en-US" sz="1400" dirty="0" err="1">
+                <a:solidFill>
+                  <a:srgbClr val="00B0F0"/>
+                </a:solidFill>
+              </a:rPr>
+              <a:t>Superieur</a:t>
+            </a:r>
+            <a:r>
+              <a:rPr lang="en-US" sz="1400" dirty="0">
+                <a:solidFill>
+                  <a:srgbClr val="00B0F0"/>
+                </a:solidFill>
+              </a:rPr>
+              <a:t> </a:t>
+            </a:r>
+            <a:r>
+              <a:rPr lang="en-US" sz="1400" dirty="0" err="1">
+                <a:solidFill>
+                  <a:srgbClr val="00B0F0"/>
+                </a:solidFill>
+              </a:rPr>
+              <a:t>hierarchique</a:t>
+            </a:r>
+            <a:endParaRPr lang="fr-US" sz="1400" dirty="0">
+              <a:solidFill>
+                <a:srgbClr val="00B0F0"/>
+              </a:solidFill>
+            </a:endParaRPr>
+          </a:p>
+        </p:txBody>
+      </p:sp>
+      <p:cxnSp>
+        <p:nvCxnSpPr>
+          <p:cNvPr id="45" name="Connecteur droit 32">
+            <a:extLst>
+              <a:ext uri="{FF2B5EF4-FFF2-40B4-BE49-F238E27FC236}">
+                <a16:creationId xmlns:a16="http://schemas.microsoft.com/office/drawing/2014/main" id="{FA84969C-D73E-407C-80B0-A6E7E90B87EE}"/>
+              </a:ext>
+            </a:extLst>
+          </p:cNvPr>
+          <p:cNvCxnSpPr>
+            <a:cxnSpLocks/>
+          </p:cNvCxnSpPr>
+          <p:nvPr/>
+        </p:nvCxnSpPr>
+        <p:spPr>
+          <a:xfrm flipH="1">
+            <a:off x="2672080" y="5513439"/>
+            <a:ext cx="452967" cy="902601"/>
+          </a:xfrm>
+          <a:prstGeom prst="line">
+            <a:avLst/>
+          </a:prstGeom>
+        </p:spPr>
+        <p:style>
+          <a:lnRef idx="1">
+            <a:schemeClr val="dk1"/>
+          </a:lnRef>
+          <a:fillRef idx="0">
+            <a:schemeClr val="dk1"/>
+          </a:fillRef>
+          <a:effectRef idx="0">
+            <a:schemeClr val="dk1"/>
+          </a:effectRef>
+          <a:fontRef idx="minor">
+            <a:schemeClr val="tx1"/>
+          </a:fontRef>
+        </p:style>
+      </p:cxnSp>
     </p:spTree>
     <p:extLst>
       <p:ext uri="{BB962C8B-B14F-4D97-AF65-F5344CB8AC3E}">
@@ -26868,6 +27221,42 @@
           </a:p>
         </p:txBody>
       </p:sp>
+      <p:sp>
+        <p:nvSpPr>
+          <p:cNvPr id="5" name="TextBox 4">
+            <a:extLst>
+              <a:ext uri="{FF2B5EF4-FFF2-40B4-BE49-F238E27FC236}">
+                <a16:creationId xmlns:a16="http://schemas.microsoft.com/office/drawing/2014/main" id="{A917DA09-CE41-4AEA-A036-EE653346DD74}"/>
+              </a:ext>
+            </a:extLst>
+          </p:cNvPr>
+          <p:cNvSpPr txBox="1"/>
+          <p:nvPr/>
+        </p:nvSpPr>
+        <p:spPr>
+          <a:xfrm>
+            <a:off x="11499575" y="6137475"/>
+            <a:ext cx="356420" cy="369332"/>
+          </a:xfrm>
+          <a:prstGeom prst="rect">
+            <a:avLst/>
+          </a:prstGeom>
+          <a:noFill/>
+        </p:spPr>
+        <p:txBody>
+          <a:bodyPr wrap="square">
+            <a:spAutoFit/>
+          </a:bodyPr>
+          <a:lstStyle/>
+          <a:p>
+            <a:r>
+              <a:rPr lang="fr-FR" dirty="0"/>
+              <a:t>6</a:t>
+            </a:r>
+            <a:endParaRPr lang="en-US" dirty="0"/>
+          </a:p>
+        </p:txBody>
+      </p:sp>
     </p:spTree>
     <p:extLst>
       <p:ext uri="{BB962C8B-B14F-4D97-AF65-F5344CB8AC3E}">
@@ -26920,144 +27309,6 @@
       </p:grpSpPr>
       <p:sp>
         <p:nvSpPr>
-          <p:cNvPr id="8" name="Espace réservé du numéro de diapositive 5">
-            <a:extLst>
-              <a:ext uri="{FF2B5EF4-FFF2-40B4-BE49-F238E27FC236}">
-                <a16:creationId xmlns:a16="http://schemas.microsoft.com/office/drawing/2014/main" id="{00248C93-EB70-81D7-320B-5C202C617F07}"/>
-              </a:ext>
-            </a:extLst>
-          </p:cNvPr>
-          <p:cNvSpPr txBox="1">
-            <a:spLocks/>
-          </p:cNvSpPr>
-          <p:nvPr/>
-        </p:nvSpPr>
-        <p:spPr>
-          <a:xfrm>
-            <a:off x="9050352" y="6356350"/>
-            <a:ext cx="3319272" cy="365125"/>
-          </a:xfrm>
-          <a:prstGeom prst="rect">
-            <a:avLst/>
-          </a:prstGeom>
-        </p:spPr>
-        <p:txBody>
-          <a:bodyPr/>
-          <a:lstStyle>
-            <a:defPPr rtl="0">
-              <a:defRPr lang="fr-FR"/>
-            </a:defPPr>
-            <a:lvl1pPr marL="0" algn="l" defTabSz="914400" rtl="0" eaLnBrk="1" latinLnBrk="0" hangingPunct="1">
-              <a:defRPr lang="fr-FR" sz="1800" kern="1200">
-                <a:solidFill>
-                  <a:schemeClr val="tx1"/>
-                </a:solidFill>
-                <a:latin typeface="+mn-lt"/>
-                <a:ea typeface="+mn-ea"/>
-                <a:cs typeface="+mn-cs"/>
-              </a:defRPr>
-            </a:lvl1pPr>
-            <a:lvl2pPr marL="457200" algn="l" defTabSz="914400" rtl="0" eaLnBrk="1" latinLnBrk="0" hangingPunct="1">
-              <a:defRPr lang="fr-FR" sz="1800" kern="1200">
-                <a:solidFill>
-                  <a:schemeClr val="tx1"/>
-                </a:solidFill>
-                <a:latin typeface="+mn-lt"/>
-                <a:ea typeface="+mn-ea"/>
-                <a:cs typeface="+mn-cs"/>
-              </a:defRPr>
-            </a:lvl2pPr>
-            <a:lvl3pPr marL="914400" algn="l" defTabSz="914400" rtl="0" eaLnBrk="1" latinLnBrk="0" hangingPunct="1">
-              <a:defRPr lang="fr-FR" sz="1800" kern="1200">
-                <a:solidFill>
-                  <a:schemeClr val="tx1"/>
-                </a:solidFill>
-                <a:latin typeface="+mn-lt"/>
-                <a:ea typeface="+mn-ea"/>
-                <a:cs typeface="+mn-cs"/>
-              </a:defRPr>
-            </a:lvl3pPr>
-            <a:lvl4pPr marL="1371600" algn="l" defTabSz="914400" rtl="0" eaLnBrk="1" latinLnBrk="0" hangingPunct="1">
-              <a:defRPr lang="fr-FR" sz="1800" kern="1200">
-                <a:solidFill>
-                  <a:schemeClr val="tx1"/>
-                </a:solidFill>
-                <a:latin typeface="+mn-lt"/>
-                <a:ea typeface="+mn-ea"/>
-                <a:cs typeface="+mn-cs"/>
-              </a:defRPr>
-            </a:lvl4pPr>
-            <a:lvl5pPr marL="1828800" algn="l" defTabSz="914400" rtl="0" eaLnBrk="1" latinLnBrk="0" hangingPunct="1">
-              <a:defRPr lang="fr-FR" sz="1800" kern="1200">
-                <a:solidFill>
-                  <a:schemeClr val="tx1"/>
-                </a:solidFill>
-                <a:latin typeface="+mn-lt"/>
-                <a:ea typeface="+mn-ea"/>
-                <a:cs typeface="+mn-cs"/>
-              </a:defRPr>
-            </a:lvl5pPr>
-            <a:lvl6pPr marL="2286000" algn="l" defTabSz="914400" rtl="0" eaLnBrk="1" latinLnBrk="0" hangingPunct="1">
-              <a:defRPr lang="fr-FR" sz="1800" kern="1200">
-                <a:solidFill>
-                  <a:schemeClr val="tx1"/>
-                </a:solidFill>
-                <a:latin typeface="+mn-lt"/>
-                <a:ea typeface="+mn-ea"/>
-                <a:cs typeface="+mn-cs"/>
-              </a:defRPr>
-            </a:lvl6pPr>
-            <a:lvl7pPr marL="2743200" algn="l" defTabSz="914400" rtl="0" eaLnBrk="1" latinLnBrk="0" hangingPunct="1">
-              <a:defRPr lang="fr-FR" sz="1800" kern="1200">
-                <a:solidFill>
-                  <a:schemeClr val="tx1"/>
-                </a:solidFill>
-                <a:latin typeface="+mn-lt"/>
-                <a:ea typeface="+mn-ea"/>
-                <a:cs typeface="+mn-cs"/>
-              </a:defRPr>
-            </a:lvl7pPr>
-            <a:lvl8pPr marL="3200400" algn="l" defTabSz="914400" rtl="0" eaLnBrk="1" latinLnBrk="0" hangingPunct="1">
-              <a:defRPr lang="fr-FR" sz="1800" kern="1200">
-                <a:solidFill>
-                  <a:schemeClr val="tx1"/>
-                </a:solidFill>
-                <a:latin typeface="+mn-lt"/>
-                <a:ea typeface="+mn-ea"/>
-                <a:cs typeface="+mn-cs"/>
-              </a:defRPr>
-            </a:lvl8pPr>
-            <a:lvl9pPr marL="3657600" algn="l" defTabSz="914400" rtl="0" eaLnBrk="1" latinLnBrk="0" hangingPunct="1">
-              <a:defRPr lang="fr-FR" sz="1800" kern="1200">
-                <a:solidFill>
-                  <a:schemeClr val="tx1"/>
-                </a:solidFill>
-                <a:latin typeface="+mn-lt"/>
-                <a:ea typeface="+mn-ea"/>
-                <a:cs typeface="+mn-cs"/>
-              </a:defRPr>
-            </a:lvl9pPr>
-          </a:lstStyle>
-          <a:p>
-            <a:fld id="{C73D9BE5-FDEF-9F4F-AE87-8B6645184203}" type="slidenum">
-              <a:rPr lang="fr-US" smtClean="0">
-                <a:solidFill>
-                  <a:srgbClr val="000000"/>
-                </a:solidFill>
-              </a:rPr>
-              <a:pPr/>
-              <a:t>8</a:t>
-            </a:fld>
-            <a:endParaRPr lang="fr-US">
-              <a:solidFill>
-                <a:srgbClr val="000000"/>
-              </a:solidFill>
-            </a:endParaRPr>
-          </a:p>
-        </p:txBody>
-      </p:sp>
-      <p:sp>
-        <p:nvSpPr>
           <p:cNvPr id="9" name="ZoneTexte 8">
             <a:extLst>
               <a:ext uri="{FF2B5EF4-FFF2-40B4-BE49-F238E27FC236}">
@@ -27644,7 +27895,7 @@
         <p:spPr>
           <a:xfrm>
             <a:off x="7580841" y="4359658"/>
-            <a:ext cx="1412374" cy="1323439"/>
+            <a:ext cx="1441548" cy="584775"/>
           </a:xfrm>
           <a:prstGeom prst="rect">
             <a:avLst/>
@@ -27675,36 +27926,27 @@
               </a:rPr>
               <a:t>Nom</a:t>
             </a:r>
-          </a:p>
-          <a:p>
             <a:r>
-              <a:rPr lang="fr-US" sz="1600" dirty="0">
+              <a:rPr lang="fr-FR" sz="1600" dirty="0">
                 <a:solidFill>
                   <a:srgbClr val="000000"/>
                 </a:solidFill>
               </a:rPr>
-              <a:t>Prénom</a:t>
+              <a:t>_</a:t>
             </a:r>
-          </a:p>
-          <a:p>
             <a:r>
-              <a:rPr lang="fr-US" sz="1600" dirty="0">
+              <a:rPr lang="fr-FR" sz="1600" dirty="0" err="1">
                 <a:solidFill>
                   <a:srgbClr val="000000"/>
                 </a:solidFill>
               </a:rPr>
-              <a:t>Email</a:t>
+              <a:t>Filère</a:t>
             </a:r>
-          </a:p>
-          <a:p>
-            <a:r>
-              <a:rPr lang="fr-US" sz="1600" dirty="0">
-                <a:solidFill>
-                  <a:srgbClr val="000000"/>
-                </a:solidFill>
-              </a:rPr>
-              <a:t>Mot_Pasee</a:t>
-            </a:r>
+            <a:endParaRPr lang="fr-FR" sz="1600" dirty="0">
+              <a:solidFill>
+                <a:srgbClr val="000000"/>
+              </a:solidFill>
+            </a:endParaRPr>
           </a:p>
         </p:txBody>
       </p:sp>
@@ -27894,8 +28136,8 @@
         </p:nvSpPr>
         <p:spPr>
           <a:xfrm>
-            <a:off x="7389189" y="864389"/>
-            <a:ext cx="2282180" cy="2167167"/>
+            <a:off x="7389189" y="861323"/>
+            <a:ext cx="2282180" cy="2884499"/>
           </a:xfrm>
           <a:prstGeom prst="rect">
             <a:avLst/>
@@ -28028,7 +28270,7 @@
         <p:spPr>
           <a:xfrm>
             <a:off x="7682418" y="1564840"/>
-            <a:ext cx="1675459" cy="1323439"/>
+            <a:ext cx="1675459" cy="2062103"/>
           </a:xfrm>
           <a:prstGeom prst="rect">
             <a:avLst/>
@@ -28052,43 +28294,85 @@
           </a:p>
           <a:p>
             <a:r>
-              <a:rPr lang="fr-US" sz="1600" dirty="0">
+              <a:rPr lang="en-US" sz="1600" dirty="0" err="1">
                 <a:solidFill>
                   <a:srgbClr val="000000"/>
                 </a:solidFill>
               </a:rPr>
-              <a:t>Nom</a:t>
+              <a:t>Filière</a:t>
             </a:r>
+            <a:endParaRPr lang="en-US" sz="1600" dirty="0">
+              <a:solidFill>
+                <a:srgbClr val="000000"/>
+              </a:solidFill>
+            </a:endParaRPr>
           </a:p>
           <a:p>
             <a:r>
-              <a:rPr lang="fr-US" sz="1600" dirty="0">
+              <a:rPr lang="en-US" sz="1600" dirty="0">
                 <a:solidFill>
                   <a:srgbClr val="000000"/>
                 </a:solidFill>
               </a:rPr>
-              <a:t>Prénom</a:t>
+              <a:t>Module</a:t>
             </a:r>
           </a:p>
           <a:p>
             <a:r>
-              <a:rPr lang="fr-US" sz="1600" dirty="0">
+              <a:rPr lang="en-US" sz="1600" dirty="0">
                 <a:solidFill>
                   <a:srgbClr val="000000"/>
                 </a:solidFill>
               </a:rPr>
-              <a:t>Email</a:t>
+              <a:t>Date</a:t>
             </a:r>
           </a:p>
           <a:p>
             <a:r>
-              <a:rPr lang="fr-US" sz="1600" dirty="0">
+              <a:rPr lang="en-US" sz="1600" dirty="0" err="1">
                 <a:solidFill>
                   <a:srgbClr val="000000"/>
                 </a:solidFill>
               </a:rPr>
-              <a:t>Mot_Pasee</a:t>
+              <a:t>Heure</a:t>
             </a:r>
+            <a:endParaRPr lang="en-US" sz="1600" dirty="0">
+              <a:solidFill>
+                <a:srgbClr val="000000"/>
+              </a:solidFill>
+            </a:endParaRPr>
+          </a:p>
+          <a:p>
+            <a:r>
+              <a:rPr lang="en-US" sz="1600" dirty="0" err="1">
+                <a:solidFill>
+                  <a:srgbClr val="000000"/>
+                </a:solidFill>
+              </a:rPr>
+              <a:t>Niveau</a:t>
+            </a:r>
+            <a:endParaRPr lang="en-US" sz="1600" dirty="0">
+              <a:solidFill>
+                <a:srgbClr val="000000"/>
+              </a:solidFill>
+            </a:endParaRPr>
+          </a:p>
+          <a:p>
+            <a:r>
+              <a:rPr lang="en-US" sz="1600" dirty="0">
+                <a:solidFill>
+                  <a:srgbClr val="000000"/>
+                </a:solidFill>
+              </a:rPr>
+              <a:t>Salle</a:t>
+            </a:r>
+          </a:p>
+          <a:p>
+            <a:endParaRPr lang="en-US" sz="1600" dirty="0">
+              <a:solidFill>
+                <a:srgbClr val="000000"/>
+              </a:solidFill>
+            </a:endParaRPr>
           </a:p>
         </p:txBody>
       </p:sp>
@@ -28548,6 +28832,42 @@
           </a:p>
         </p:txBody>
       </p:sp>
+      <p:sp>
+        <p:nvSpPr>
+          <p:cNvPr id="37" name="TextBox 36">
+            <a:extLst>
+              <a:ext uri="{FF2B5EF4-FFF2-40B4-BE49-F238E27FC236}">
+                <a16:creationId xmlns:a16="http://schemas.microsoft.com/office/drawing/2014/main" id="{2D1B9623-8D89-44A5-B794-445EC8ACF052}"/>
+              </a:ext>
+            </a:extLst>
+          </p:cNvPr>
+          <p:cNvSpPr txBox="1"/>
+          <p:nvPr/>
+        </p:nvSpPr>
+        <p:spPr>
+          <a:xfrm>
+            <a:off x="11499575" y="6137475"/>
+            <a:ext cx="356420" cy="369332"/>
+          </a:xfrm>
+          <a:prstGeom prst="rect">
+            <a:avLst/>
+          </a:prstGeom>
+          <a:noFill/>
+        </p:spPr>
+        <p:txBody>
+          <a:bodyPr wrap="square">
+            <a:spAutoFit/>
+          </a:bodyPr>
+          <a:lstStyle/>
+          <a:p>
+            <a:r>
+              <a:rPr lang="fr-FR" dirty="0"/>
+              <a:t>7</a:t>
+            </a:r>
+            <a:endParaRPr lang="en-US" dirty="0"/>
+          </a:p>
+        </p:txBody>
+      </p:sp>
     </p:spTree>
     <p:extLst>
       <p:ext uri="{BB962C8B-B14F-4D97-AF65-F5344CB8AC3E}">
@@ -28716,6 +29036,42 @@
               <a:t>9</a:t>
             </a:fld>
             <a:endParaRPr lang="fr-FR" dirty="0"/>
+          </a:p>
+        </p:txBody>
+      </p:sp>
+      <p:sp>
+        <p:nvSpPr>
+          <p:cNvPr id="5" name="TextBox 4">
+            <a:extLst>
+              <a:ext uri="{FF2B5EF4-FFF2-40B4-BE49-F238E27FC236}">
+                <a16:creationId xmlns:a16="http://schemas.microsoft.com/office/drawing/2014/main" id="{D59A107F-C142-4E4E-92F6-0E1279616771}"/>
+              </a:ext>
+            </a:extLst>
+          </p:cNvPr>
+          <p:cNvSpPr txBox="1"/>
+          <p:nvPr/>
+        </p:nvSpPr>
+        <p:spPr>
+          <a:xfrm>
+            <a:off x="11499575" y="6137475"/>
+            <a:ext cx="356420" cy="369332"/>
+          </a:xfrm>
+          <a:prstGeom prst="rect">
+            <a:avLst/>
+          </a:prstGeom>
+          <a:noFill/>
+        </p:spPr>
+        <p:txBody>
+          <a:bodyPr wrap="square">
+            <a:spAutoFit/>
+          </a:bodyPr>
+          <a:lstStyle/>
+          <a:p>
+            <a:r>
+              <a:rPr lang="fr-FR" dirty="0"/>
+              <a:t>8</a:t>
+            </a:r>
+            <a:endParaRPr lang="en-US" dirty="0"/>
           </a:p>
         </p:txBody>
       </p:sp>
@@ -29907,15 +30263,6 @@
 </file>
 
 <file path=customXml/item2.xml><?xml version="1.0" encoding="utf-8"?>
-<?mso-contentType ?>
-<FormTemplates xmlns="http://schemas.microsoft.com/sharepoint/v3/contenttype/forms">
-  <Display>DocumentLibraryForm</Display>
-  <Edit>DocumentLibraryForm</Edit>
-  <New>DocumentLibraryForm</New>
-</FormTemplates>
-</file>
-
-<file path=customXml/item3.xml><?xml version="1.0" encoding="utf-8"?>
 <p:properties xmlns:p="http://schemas.microsoft.com/office/2006/metadata/properties" xmlns:xsi="http://www.w3.org/2001/XMLSchema-instance" xmlns:pc="http://schemas.microsoft.com/office/infopath/2007/PartnerControls">
   <documentManagement>
     <_ip_UnifiedCompliancePolicyUIAction xmlns="http://schemas.microsoft.com/sharepoint/v3" xsi:nil="true"/>
@@ -29935,17 +30282,27 @@
 </p:properties>
 </file>
 
+<file path=customXml/item3.xml><?xml version="1.0" encoding="utf-8"?>
+<?mso-contentType ?>
+<FormTemplates xmlns="http://schemas.microsoft.com/sharepoint/v3/contenttype/forms">
+  <Display>DocumentLibraryForm</Display>
+  <Edit>DocumentLibraryForm</Edit>
+  <New>DocumentLibraryForm</New>
+</FormTemplates>
+</file>
+
 <file path=customXml/itemProps1.xml><?xml version="1.0" encoding="utf-8"?>
 <ds:datastoreItem xmlns:ds="http://schemas.openxmlformats.org/officeDocument/2006/customXml" ds:itemID="{E8C75813-FBB5-478B-828B-AC67018E2728}">
   <ds:schemaRefs>
     <ds:schemaRef ds:uri="http://schemas.microsoft.com/office/2006/metadata/contentType"/>
     <ds:schemaRef ds:uri="http://schemas.microsoft.com/office/2006/metadata/properties/metaAttributes"/>
+    <ds:schemaRef ds:uri="http://www.w3.org/2000/xmlns/"/>
     <ds:schemaRef ds:uri="http://www.w3.org/2001/XMLSchema"/>
-    <ds:schemaRef ds:uri="http://schemas.microsoft.com/office/2006/metadata/properties"/>
     <ds:schemaRef ds:uri="http://schemas.microsoft.com/sharepoint/v3"/>
     <ds:schemaRef ds:uri="71af3243-3dd4-4a8d-8c0d-dd76da1f02a5"/>
     <ds:schemaRef ds:uri="16c05727-aa75-4e4a-9b5f-8a80a1165891"/>
     <ds:schemaRef ds:uri="230e9df3-be65-4c73-a93b-d1236ebd677e"/>
+    <ds:schemaRef ds:uri="http://schemas.microsoft.com/office/2006/metadata/properties"/>
     <ds:schemaRef ds:uri="http://schemas.microsoft.com/office/2006/documentManagement/types"/>
     <ds:schemaRef ds:uri="http://schemas.microsoft.com/office/infopath/2007/PartnerControls"/>
     <ds:schemaRef ds:uri="http://schemas.openxmlformats.org/package/2006/metadata/core-properties"/>
@@ -29957,6 +30314,20 @@
 </file>
 
 <file path=customXml/itemProps2.xml><?xml version="1.0" encoding="utf-8"?>
+<ds:datastoreItem xmlns:ds="http://schemas.openxmlformats.org/officeDocument/2006/customXml" ds:itemID="{C431C809-C6F0-48D7-BF3E-4570CDAF51AF}">
+  <ds:schemaRefs>
+    <ds:schemaRef ds:uri="http://schemas.microsoft.com/office/2006/metadata/properties"/>
+    <ds:schemaRef ds:uri="http://www.w3.org/2000/xmlns/"/>
+    <ds:schemaRef ds:uri="http://schemas.microsoft.com/sharepoint/v3"/>
+    <ds:schemaRef ds:uri="http://www.w3.org/2001/XMLSchema-instance"/>
+    <ds:schemaRef ds:uri="71af3243-3dd4-4a8d-8c0d-dd76da1f02a5"/>
+    <ds:schemaRef ds:uri="http://schemas.microsoft.com/office/infopath/2007/PartnerControls"/>
+    <ds:schemaRef ds:uri="230e9df3-be65-4c73-a93b-d1236ebd677e"/>
+  </ds:schemaRefs>
+</ds:datastoreItem>
+</file>
+
+<file path=customXml/itemProps3.xml><?xml version="1.0" encoding="utf-8"?>
 <ds:datastoreItem xmlns:ds="http://schemas.openxmlformats.org/officeDocument/2006/customXml" ds:itemID="{7E30B917-A3AD-46B5-A6A4-F876E3BAC36E}">
   <ds:schemaRefs>
     <ds:schemaRef ds:uri="http://schemas.microsoft.com/sharepoint/v3/contenttype/forms"/>
@@ -29964,18 +30335,6 @@
 </ds:datastoreItem>
 </file>
 
-<file path=customXml/itemProps3.xml><?xml version="1.0" encoding="utf-8"?>
-<ds:datastoreItem xmlns:ds="http://schemas.openxmlformats.org/officeDocument/2006/customXml" ds:itemID="{C431C809-C6F0-48D7-BF3E-4570CDAF51AF}">
-  <ds:schemaRefs>
-    <ds:schemaRef ds:uri="http://schemas.microsoft.com/office/2006/metadata/properties"/>
-    <ds:schemaRef ds:uri="http://schemas.microsoft.com/office/infopath/2007/PartnerControls"/>
-    <ds:schemaRef ds:uri="http://schemas.microsoft.com/sharepoint/v3"/>
-    <ds:schemaRef ds:uri="71af3243-3dd4-4a8d-8c0d-dd76da1f02a5"/>
-    <ds:schemaRef ds:uri="230e9df3-be65-4c73-a93b-d1236ebd677e"/>
-  </ds:schemaRefs>
-</ds:datastoreItem>
-</file>
-
 <file path=docMetadata/LabelInfo.xml><?xml version="1.0" encoding="utf-8"?>
 <clbl:labelList xmlns:clbl="http://schemas.microsoft.com/office/2020/mipLabelMetadata"/>
 </file>
</xml_diff>